<commit_message>
Correcting Arctic tile rotation ppt
</commit_message>
<xml_diff>
--- a/c1440_llc2160/regions/Arctic/LLC_GRID.pptx
+++ b/c1440_llc2160/regions/Arctic/LLC_GRID.pptx
@@ -106,6 +106,11 @@
       </a:defRPr>
     </a:lvl9pPr>
   </p:defaultTextStyle>
+  <p:extLst>
+    <p:ext uri="{EFAFB233-063F-42B5-8137-9DF3F51BA10A}">
+      <p15:sldGuideLst xmlns:p15="http://schemas.microsoft.com/office/powerpoint/2012/main"/>
+    </p:ext>
+  </p:extLst>
 </p:presentation>
 </file>
 
@@ -256,7 +261,7 @@
           <a:p>
             <a:fld id="{F4856BEB-F4CF-6A4A-99BA-452D405EB719}" type="datetimeFigureOut">
               <a:rPr lang="en-US" smtClean="0"/>
-              <a:t>10/9/23</a:t>
+              <a:t>7/24/24</a:t>
             </a:fld>
             <a:endParaRPr lang="en-US"/>
           </a:p>
@@ -454,7 +459,7 @@
           <a:p>
             <a:fld id="{F4856BEB-F4CF-6A4A-99BA-452D405EB719}" type="datetimeFigureOut">
               <a:rPr lang="en-US" smtClean="0"/>
-              <a:t>10/9/23</a:t>
+              <a:t>7/24/24</a:t>
             </a:fld>
             <a:endParaRPr lang="en-US"/>
           </a:p>
@@ -662,7 +667,7 @@
           <a:p>
             <a:fld id="{F4856BEB-F4CF-6A4A-99BA-452D405EB719}" type="datetimeFigureOut">
               <a:rPr lang="en-US" smtClean="0"/>
-              <a:t>10/9/23</a:t>
+              <a:t>7/24/24</a:t>
             </a:fld>
             <a:endParaRPr lang="en-US"/>
           </a:p>
@@ -860,7 +865,7 @@
           <a:p>
             <a:fld id="{F4856BEB-F4CF-6A4A-99BA-452D405EB719}" type="datetimeFigureOut">
               <a:rPr lang="en-US" smtClean="0"/>
-              <a:t>10/9/23</a:t>
+              <a:t>7/24/24</a:t>
             </a:fld>
             <a:endParaRPr lang="en-US"/>
           </a:p>
@@ -1135,7 +1140,7 @@
           <a:p>
             <a:fld id="{F4856BEB-F4CF-6A4A-99BA-452D405EB719}" type="datetimeFigureOut">
               <a:rPr lang="en-US" smtClean="0"/>
-              <a:t>10/9/23</a:t>
+              <a:t>7/24/24</a:t>
             </a:fld>
             <a:endParaRPr lang="en-US"/>
           </a:p>
@@ -1400,7 +1405,7 @@
           <a:p>
             <a:fld id="{F4856BEB-F4CF-6A4A-99BA-452D405EB719}" type="datetimeFigureOut">
               <a:rPr lang="en-US" smtClean="0"/>
-              <a:t>10/9/23</a:t>
+              <a:t>7/24/24</a:t>
             </a:fld>
             <a:endParaRPr lang="en-US"/>
           </a:p>
@@ -1812,7 +1817,7 @@
           <a:p>
             <a:fld id="{F4856BEB-F4CF-6A4A-99BA-452D405EB719}" type="datetimeFigureOut">
               <a:rPr lang="en-US" smtClean="0"/>
-              <a:t>10/9/23</a:t>
+              <a:t>7/24/24</a:t>
             </a:fld>
             <a:endParaRPr lang="en-US"/>
           </a:p>
@@ -1953,7 +1958,7 @@
           <a:p>
             <a:fld id="{F4856BEB-F4CF-6A4A-99BA-452D405EB719}" type="datetimeFigureOut">
               <a:rPr lang="en-US" smtClean="0"/>
-              <a:t>10/9/23</a:t>
+              <a:t>7/24/24</a:t>
             </a:fld>
             <a:endParaRPr lang="en-US"/>
           </a:p>
@@ -2066,7 +2071,7 @@
           <a:p>
             <a:fld id="{F4856BEB-F4CF-6A4A-99BA-452D405EB719}" type="datetimeFigureOut">
               <a:rPr lang="en-US" smtClean="0"/>
-              <a:t>10/9/23</a:t>
+              <a:t>7/24/24</a:t>
             </a:fld>
             <a:endParaRPr lang="en-US"/>
           </a:p>
@@ -2377,7 +2382,7 @@
           <a:p>
             <a:fld id="{F4856BEB-F4CF-6A4A-99BA-452D405EB719}" type="datetimeFigureOut">
               <a:rPr lang="en-US" smtClean="0"/>
-              <a:t>10/9/23</a:t>
+              <a:t>7/24/24</a:t>
             </a:fld>
             <a:endParaRPr lang="en-US"/>
           </a:p>
@@ -2665,7 +2670,7 @@
           <a:p>
             <a:fld id="{F4856BEB-F4CF-6A4A-99BA-452D405EB719}" type="datetimeFigureOut">
               <a:rPr lang="en-US" smtClean="0"/>
-              <a:t>10/9/23</a:t>
+              <a:t>7/24/24</a:t>
             </a:fld>
             <a:endParaRPr lang="en-US"/>
           </a:p>
@@ -2906,7 +2911,7 @@
           <a:p>
             <a:fld id="{F4856BEB-F4CF-6A4A-99BA-452D405EB719}" type="datetimeFigureOut">
               <a:rPr lang="en-US" smtClean="0"/>
-              <a:t>10/9/23</a:t>
+              <a:t>7/24/24</a:t>
             </a:fld>
             <a:endParaRPr lang="en-US"/>
           </a:p>
@@ -8945,8 +8950,8 @@
         </p:nvSpPr>
         <p:spPr>
           <a:xfrm>
-            <a:off x="7159863" y="2912528"/>
-            <a:ext cx="290464" cy="369332"/>
+            <a:off x="7159863" y="2869996"/>
+            <a:ext cx="293670" cy="369332"/>
           </a:xfrm>
           <a:prstGeom prst="rect">
             <a:avLst/>
@@ -8965,7 +8970,7 @@
                   <a:srgbClr val="C00000"/>
                 </a:solidFill>
               </a:rPr>
-              <a:t>x</a:t>
+              <a:t>y</a:t>
             </a:r>
           </a:p>
         </p:txBody>

</xml_diff>